<commit_message>
presentation video added and ppt update
</commit_message>
<xml_diff>
--- a/Midterm/Group 6 - midterm presentation.pptx
+++ b/Midterm/Group 6 - midterm presentation.pptx
@@ -5,7 +5,7 @@
     <p:sldMasterId id="2147483648" r:id="rId1"/>
   </p:sldMasterIdLst>
   <p:notesMasterIdLst>
-    <p:notesMasterId r:id="rId12"/>
+    <p:notesMasterId r:id="rId13"/>
   </p:notesMasterIdLst>
   <p:sldIdLst>
     <p:sldId id="256" r:id="rId2"/>
@@ -18,6 +18,7 @@
     <p:sldId id="263" r:id="rId9"/>
     <p:sldId id="264" r:id="rId10"/>
     <p:sldId id="265" r:id="rId11"/>
+    <p:sldId id="266" r:id="rId12"/>
   </p:sldIdLst>
   <p:sldSz cx="12192000" cy="6858000"/>
   <p:notesSz cx="6858000" cy="9144000"/>
@@ -266,7 +267,7 @@
       </p15:sldGuideLst>
     </p:ext>
     <p:ext uri="http://customooxmlschemas.google.com/">
-      <go:slidesCustomData xmlns:go="http://customooxmlschemas.google.com/" xmlns:ahyp="http://schemas.microsoft.com/office/drawing/2018/hyperlinkcolor" xmlns:p15="http://schemas.microsoft.com/office/powerpoint/2012/main" xmlns:p14="http://schemas.microsoft.com/office/powerpoint/2010/main" xmlns:com="http://schemas.openxmlformats.org/drawingml/2006/compatibility" xmlns:pvml="urn:schemas-microsoft-com:office:powerpoint" xmlns:v="urn:schemas-microsoft-com:vml" xmlns:o="urn:schemas-microsoft-com:office:office" xmlns:dgm="http://schemas.openxmlformats.org/drawingml/2006/diagram" xmlns:c="http://schemas.openxmlformats.org/drawingml/2006/chart" xmlns:mv="urn:schemas-microsoft-com:mac:vml" xmlns:mc="http://schemas.openxmlformats.org/markup-compatibility/2006" xmlns="" r:id="rId17" roundtripDataSignature="AMtx7mjWTqt+wchSwiJadg0YphD00Ffphw=="/>
+      <go:slidesCustomData xmlns="" xmlns:mc="http://schemas.openxmlformats.org/markup-compatibility/2006" xmlns:mv="urn:schemas-microsoft-com:mac:vml" xmlns:c="http://schemas.openxmlformats.org/drawingml/2006/chart" xmlns:dgm="http://schemas.openxmlformats.org/drawingml/2006/diagram" xmlns:o="urn:schemas-microsoft-com:office:office" xmlns:v="urn:schemas-microsoft-com:vml" xmlns:pvml="urn:schemas-microsoft-com:office:powerpoint" xmlns:com="http://schemas.openxmlformats.org/drawingml/2006/compatibility" xmlns:p14="http://schemas.microsoft.com/office/powerpoint/2010/main" xmlns:p15="http://schemas.microsoft.com/office/powerpoint/2012/main" xmlns:ahyp="http://schemas.microsoft.com/office/drawing/2018/hyperlinkcolor" xmlns:go="http://customooxmlschemas.google.com/" r:id="rId17" roundtripDataSignature="AMtx7mjWTqt+wchSwiJadg0YphD00Ffphw=="/>
     </p:ext>
   </p:extLst>
 </p:presentation>
@@ -1784,7 +1785,7 @@
               <a:buSzPts val="1400"/>
               <a:buNone/>
             </a:pPr>
-            <a:endParaRPr/>
+            <a:endParaRPr dirty="0"/>
           </a:p>
         </p:txBody>
       </p:sp>
@@ -1962,10 +1963,10 @@
               <a:buNone/>
             </a:pPr>
             <a:r>
-              <a:rPr lang="en-US"/>
+              <a:rPr lang="en-US" dirty="0"/>
               <a:t>We plan to implement a python-based module to preprocess all images from the training set, validation set, and test set. This module will be used to perform facial recognition first, keeping only the facial region of the image. </a:t>
             </a:r>
-            <a:endParaRPr/>
+            <a:endParaRPr dirty="0"/>
           </a:p>
           <a:p>
             <a:pPr marL="0" lvl="0" indent="0" algn="l" rtl="0">
@@ -1986,10 +1987,10 @@
               <a:buNone/>
             </a:pPr>
             <a:r>
-              <a:rPr lang="en-US"/>
+              <a:rPr lang="en-US" dirty="0"/>
               <a:t>This module will also contain algorithms to extract eye regions and mouth regions separately. For the training set and validation set, either eye feature extraction or mouth region extraction functionality will be used to keep only the region that matches the label. For the test set, or real-time drowsiness detection test, we will use both functionalities to extract both eye and mouth region features and perform classification.</a:t>
             </a:r>
-            <a:endParaRPr/>
+            <a:endParaRPr dirty="0"/>
           </a:p>
         </p:txBody>
       </p:sp>
@@ -2044,6 +2045,123 @@
         </p:txBody>
       </p:sp>
     </p:spTree>
+  </p:cSld>
+  <p:clrMapOvr>
+    <a:masterClrMapping/>
+  </p:clrMapOvr>
+</p:notes>
+</file>
+
+<file path=ppt/notesSlides/notesSlide11.xml><?xml version="1.0" encoding="utf-8"?>
+<p:notes xmlns:a="http://schemas.openxmlformats.org/drawingml/2006/main" xmlns:r="http://schemas.openxmlformats.org/officeDocument/2006/relationships" xmlns:p="http://schemas.openxmlformats.org/presentationml/2006/main">
+  <p:cSld>
+    <p:spTree>
+      <p:nvGrpSpPr>
+        <p:cNvPr id="1" name=""/>
+        <p:cNvGrpSpPr/>
+        <p:nvPr/>
+      </p:nvGrpSpPr>
+      <p:grpSpPr>
+        <a:xfrm>
+          <a:off x="0" y="0"/>
+          <a:ext cx="0" cy="0"/>
+          <a:chOff x="0" y="0"/>
+          <a:chExt cx="0" cy="0"/>
+        </a:xfrm>
+      </p:grpSpPr>
+      <p:sp>
+        <p:nvSpPr>
+          <p:cNvPr id="2" name="Slide Image Placeholder 1"/>
+          <p:cNvSpPr>
+            <a:spLocks noGrp="1" noRot="1" noChangeAspect="1"/>
+          </p:cNvSpPr>
+          <p:nvPr>
+            <p:ph type="sldImg"/>
+          </p:nvPr>
+        </p:nvSpPr>
+        <p:spPr/>
+      </p:sp>
+      <p:sp>
+        <p:nvSpPr>
+          <p:cNvPr id="3" name="Notes Placeholder 2"/>
+          <p:cNvSpPr>
+            <a:spLocks noGrp="1"/>
+          </p:cNvSpPr>
+          <p:nvPr>
+            <p:ph type="body" idx="1"/>
+          </p:nvPr>
+        </p:nvSpPr>
+        <p:spPr/>
+        <p:txBody>
+          <a:bodyPr/>
+          <a:lstStyle/>
+          <a:p>
+            <a:endParaRPr lang="en-US" dirty="0"/>
+          </a:p>
+        </p:txBody>
+      </p:sp>
+      <p:sp>
+        <p:nvSpPr>
+          <p:cNvPr id="4" name="Slide Number Placeholder 3"/>
+          <p:cNvSpPr>
+            <a:spLocks noGrp="1"/>
+          </p:cNvSpPr>
+          <p:nvPr>
+            <p:ph type="sldNum" idx="12"/>
+          </p:nvPr>
+        </p:nvSpPr>
+        <p:spPr/>
+        <p:txBody>
+          <a:bodyPr/>
+          <a:lstStyle/>
+          <a:p>
+            <a:pPr marL="0" marR="0" lvl="0" indent="0" algn="r" rtl="0">
+              <a:lnSpc>
+                <a:spcPct val="100000"/>
+              </a:lnSpc>
+              <a:spcBef>
+                <a:spcPts val="0"/>
+              </a:spcBef>
+              <a:spcAft>
+                <a:spcPts val="0"/>
+              </a:spcAft>
+              <a:buClr>
+                <a:srgbClr val="000000"/>
+              </a:buClr>
+              <a:buSzPts val="1200"/>
+              <a:buFont typeface="Arial"/>
+              <a:buNone/>
+            </a:pPr>
+            <a:fld id="{00000000-1234-1234-1234-123412341234}" type="slidenum">
+              <a:rPr lang="en-US" sz="1200" b="0" i="0" u="none" strike="noStrike" cap="none" smtClean="0">
+                <a:solidFill>
+                  <a:schemeClr val="dk1"/>
+                </a:solidFill>
+                <a:latin typeface="Calibri"/>
+                <a:ea typeface="Calibri"/>
+                <a:cs typeface="Calibri"/>
+                <a:sym typeface="Calibri"/>
+              </a:rPr>
+              <a:t>11</a:t>
+            </a:fld>
+            <a:endParaRPr lang="en-US" sz="1200" b="0" i="0" u="none" strike="noStrike" cap="none">
+              <a:solidFill>
+                <a:schemeClr val="dk1"/>
+              </a:solidFill>
+              <a:latin typeface="Calibri"/>
+              <a:ea typeface="Calibri"/>
+              <a:cs typeface="Calibri"/>
+              <a:sym typeface="Calibri"/>
+            </a:endParaRPr>
+          </a:p>
+        </p:txBody>
+      </p:sp>
+    </p:spTree>
+    <p:extLst>
+      <p:ext uri="{BB962C8B-B14F-4D97-AF65-F5344CB8AC3E}">
+        <p14:creationId xmlns:p14="http://schemas.microsoft.com/office/powerpoint/2010/main" val="1314580968"/>
+      </p:ext>
+    </p:extLst>
   </p:cSld>
   <p:clrMapOvr>
     <a:masterClrMapping/>
@@ -2109,7 +2227,7 @@
               </a:spcAft>
               <a:buNone/>
             </a:pPr>
-            <a:endParaRPr>
+            <a:endParaRPr dirty="0">
               <a:latin typeface="Times New Roman"/>
               <a:ea typeface="Times New Roman"/>
               <a:cs typeface="Times New Roman"/>
@@ -2135,7 +2253,7 @@
               <a:buChar char="•"/>
             </a:pPr>
             <a:r>
-              <a:rPr lang="en-US">
+              <a:rPr lang="en-US" dirty="0">
                 <a:highlight>
                   <a:srgbClr val="FFFFFF"/>
                 </a:highlight>
@@ -2144,9 +2262,9 @@
                 <a:cs typeface="Times New Roman"/>
                 <a:sym typeface="Times New Roman"/>
               </a:rPr>
-              <a:t>The U. S. National Highway Traffic Safety Administration (NHTSA) reports that drowsy driving is related to at least 100,000 motor-vehicle crashes and more than 1,500 deaths per year. The estimated annual monetary loss related to drowsy driving is about $12.5 billion.</a:t>
+              <a:t>The American National Highway Traffic Safety Administration reports that drowsy driving is related to at least 100,000 motor-vehicle crashes and more than 1,500 deaths per year. The estimated annual monetary loss related is estimated to be about about $12.5 billion.</a:t>
             </a:r>
-            <a:endParaRPr>
+            <a:endParaRPr dirty="0">
               <a:highlight>
                 <a:srgbClr val="FFFFFF"/>
               </a:highlight>
@@ -2169,7 +2287,7 @@
               </a:spcAft>
               <a:buNone/>
             </a:pPr>
-            <a:endParaRPr>
+            <a:endParaRPr dirty="0">
               <a:highlight>
                 <a:srgbClr val="FFFFFF"/>
               </a:highlight>
@@ -2197,7 +2315,7 @@
               <a:buChar char="•"/>
             </a:pPr>
             <a:r>
-              <a:rPr lang="en-US">
+              <a:rPr lang="en-US" dirty="0">
                 <a:latin typeface="Times New Roman"/>
                 <a:ea typeface="Times New Roman"/>
                 <a:cs typeface="Times New Roman"/>
@@ -2206,7 +2324,7 @@
               <a:t>Drowsiness is identified as one of the major causes of fatal traffic accidents. Unfortunately, about 20% of drivers tend to show drowsiness while driving, reported by National Safety Council</a:t>
             </a:r>
             <a:r>
-              <a:rPr lang="en-US" baseline="30000">
+              <a:rPr lang="en-US" baseline="30000" dirty="0">
                 <a:latin typeface="Times New Roman"/>
                 <a:ea typeface="Times New Roman"/>
                 <a:cs typeface="Times New Roman"/>
@@ -2215,7 +2333,7 @@
               <a:t>[1]</a:t>
             </a:r>
             <a:r>
-              <a:rPr lang="en-US">
+              <a:rPr lang="en-US" dirty="0">
                 <a:latin typeface="Times New Roman"/>
                 <a:ea typeface="Times New Roman"/>
                 <a:cs typeface="Times New Roman"/>
@@ -2223,7 +2341,7 @@
               </a:rPr>
               <a:t>.</a:t>
             </a:r>
-            <a:endParaRPr>
+            <a:endParaRPr dirty="0">
               <a:latin typeface="Times New Roman"/>
               <a:ea typeface="Times New Roman"/>
               <a:cs typeface="Times New Roman"/>
@@ -2243,7 +2361,7 @@
               </a:spcAft>
               <a:buNone/>
             </a:pPr>
-            <a:endParaRPr>
+            <a:endParaRPr dirty="0">
               <a:latin typeface="Times New Roman"/>
               <a:ea typeface="Times New Roman"/>
               <a:cs typeface="Times New Roman"/>
@@ -2268,7 +2386,7 @@
               <a:buChar char="•"/>
             </a:pPr>
             <a:r>
-              <a:rPr lang="en-US">
+              <a:rPr lang="en-US" dirty="0">
                 <a:latin typeface="Times New Roman"/>
                 <a:ea typeface="Times New Roman"/>
                 <a:cs typeface="Times New Roman"/>
@@ -2276,7 +2394,7 @@
               </a:rPr>
               <a:t> This project aims to combine a fine-tuned neural network and a python-based face detection and feature extraction module into a real-time drowsiness detection system that will contribute to improving road safety.</a:t>
             </a:r>
-            <a:endParaRPr/>
+            <a:endParaRPr dirty="0"/>
           </a:p>
         </p:txBody>
       </p:sp>
@@ -2811,10 +2929,10 @@
               <a:buNone/>
             </a:pPr>
             <a:r>
-              <a:rPr lang="en-US"/>
+              <a:rPr lang="en-US" dirty="0"/>
               <a:t>In this stage, we have implemented Alex Net. The result shows a possible overfitting and training time complexity performance is not well. Since other networks are likely to have even deeper architectures than Alex Net, they are likely to return an overfitting result as well.</a:t>
             </a:r>
-            <a:endParaRPr/>
+            <a:endParaRPr dirty="0"/>
           </a:p>
           <a:p>
             <a:pPr marL="0" lvl="0" indent="0" algn="l" rtl="0">
@@ -2835,10 +2953,10 @@
               <a:buNone/>
             </a:pPr>
             <a:r>
-              <a:rPr lang="en-US"/>
+              <a:rPr lang="en-US" dirty="0"/>
               <a:t>We decided to build a less complex architecture until more suitable data is found and added on top of our current dataset. This network will also serve as the baseline for all other networks we are going to explore in the next stage</a:t>
             </a:r>
-            <a:endParaRPr/>
+            <a:endParaRPr dirty="0"/>
           </a:p>
         </p:txBody>
       </p:sp>
@@ -10979,6 +11097,495 @@
 </p:sld>
 </file>
 
+<file path=ppt/slides/slide11.xml><?xml version="1.0" encoding="utf-8"?>
+<p:sld xmlns:a="http://schemas.openxmlformats.org/drawingml/2006/main" xmlns:r="http://schemas.openxmlformats.org/officeDocument/2006/relationships" xmlns:p="http://schemas.openxmlformats.org/presentationml/2006/main">
+  <p:cSld>
+    <p:bg>
+      <p:bgPr>
+        <a:solidFill>
+          <a:schemeClr val="bg1"/>
+        </a:solidFill>
+        <a:effectLst/>
+      </p:bgPr>
+    </p:bg>
+    <p:spTree>
+      <p:nvGrpSpPr>
+        <p:cNvPr id="1" name=""/>
+        <p:cNvGrpSpPr/>
+        <p:nvPr/>
+      </p:nvGrpSpPr>
+      <p:grpSpPr>
+        <a:xfrm>
+          <a:off x="0" y="0"/>
+          <a:ext cx="0" cy="0"/>
+          <a:chOff x="0" y="0"/>
+          <a:chExt cx="0" cy="0"/>
+        </a:xfrm>
+      </p:grpSpPr>
+      <p:sp useBgFill="1">
+        <p:nvSpPr>
+          <p:cNvPr id="25" name="Rectangle 24">
+            <a:extLst>
+              <a:ext uri="{FF2B5EF4-FFF2-40B4-BE49-F238E27FC236}">
+                <a16:creationId xmlns:a16="http://schemas.microsoft.com/office/drawing/2014/main" id="{6FD9D7E7-DF77-490E-BCAC-DB04B3804C10}"/>
+              </a:ext>
+              <a:ext uri="{C183D7F6-B498-43B3-948B-1728B52AA6E4}">
+                <adec:decorative xmlns:adec="http://schemas.microsoft.com/office/drawing/2017/decorative" val="1"/>
+              </a:ext>
+            </a:extLst>
+          </p:cNvPr>
+          <p:cNvSpPr>
+            <a:spLocks noGrp="1" noRot="1" noChangeAspect="1" noMove="1" noResize="1" noEditPoints="1" noAdjustHandles="1" noChangeArrowheads="1" noChangeShapeType="1" noTextEdit="1"/>
+          </p:cNvSpPr>
+          <p:nvPr>
+            <p:extLst>
+              <p:ext uri="{386F3935-93C4-4BCD-93E2-E3B085C9AB24}">
+                <p16:designElem xmlns:p16="http://schemas.microsoft.com/office/powerpoint/2015/main" val="1"/>
+              </p:ext>
+            </p:extLst>
+          </p:nvPr>
+        </p:nvSpPr>
+        <p:spPr>
+          <a:xfrm>
+            <a:off x="0" y="0"/>
+            <a:ext cx="12192000" cy="6858000"/>
+          </a:xfrm>
+          <a:prstGeom prst="rect">
+            <a:avLst/>
+          </a:prstGeom>
+          <a:ln>
+            <a:noFill/>
+          </a:ln>
+        </p:spPr>
+        <p:style>
+          <a:lnRef idx="2">
+            <a:schemeClr val="accent1">
+              <a:shade val="50000"/>
+            </a:schemeClr>
+          </a:lnRef>
+          <a:fillRef idx="1">
+            <a:schemeClr val="accent1"/>
+          </a:fillRef>
+          <a:effectRef idx="0">
+            <a:schemeClr val="accent1"/>
+          </a:effectRef>
+          <a:fontRef idx="minor">
+            <a:schemeClr val="lt1"/>
+          </a:fontRef>
+        </p:style>
+        <p:txBody>
+          <a:bodyPr rtlCol="0" anchor="ctr"/>
+          <a:lstStyle/>
+          <a:p>
+            <a:pPr algn="ctr"/>
+            <a:endParaRPr lang="en-US"/>
+          </a:p>
+        </p:txBody>
+      </p:sp>
+      <p:sp>
+        <p:nvSpPr>
+          <p:cNvPr id="2" name="Title 1">
+            <a:extLst>
+              <a:ext uri="{FF2B5EF4-FFF2-40B4-BE49-F238E27FC236}">
+                <a16:creationId xmlns:a16="http://schemas.microsoft.com/office/drawing/2014/main" id="{3CD0F550-59CA-7049-8035-E915DCE12C57}"/>
+              </a:ext>
+            </a:extLst>
+          </p:cNvPr>
+          <p:cNvSpPr>
+            <a:spLocks noGrp="1"/>
+          </p:cNvSpPr>
+          <p:nvPr>
+            <p:ph type="title"/>
+          </p:nvPr>
+        </p:nvSpPr>
+        <p:spPr>
+          <a:xfrm>
+            <a:off x="7105395" y="993913"/>
+            <a:ext cx="4360386" cy="3776869"/>
+          </a:xfrm>
+        </p:spPr>
+        <p:txBody>
+          <a:bodyPr vert="horz" lIns="91440" tIns="45720" rIns="91440" bIns="45720" rtlCol="0" anchor="b">
+            <a:normAutofit/>
+          </a:bodyPr>
+          <a:lstStyle/>
+          <a:p>
+            <a:pPr>
+              <a:lnSpc>
+                <a:spcPct val="90000"/>
+              </a:lnSpc>
+              <a:spcBef>
+                <a:spcPct val="0"/>
+              </a:spcBef>
+            </a:pPr>
+            <a:r>
+              <a:rPr lang="en-US" sz="8000" kern="1200">
+                <a:solidFill>
+                  <a:schemeClr val="tx1"/>
+                </a:solidFill>
+                <a:latin typeface="+mj-lt"/>
+                <a:ea typeface="+mj-ea"/>
+                <a:cs typeface="+mj-cs"/>
+              </a:rPr>
+              <a:t>Thank You</a:t>
+            </a:r>
+          </a:p>
+        </p:txBody>
+      </p:sp>
+      <p:sp>
+        <p:nvSpPr>
+          <p:cNvPr id="27" name="Freeform: Shape 26">
+            <a:extLst>
+              <a:ext uri="{FF2B5EF4-FFF2-40B4-BE49-F238E27FC236}">
+                <a16:creationId xmlns:a16="http://schemas.microsoft.com/office/drawing/2014/main" id="{D89AF302-1573-4DC3-9F33-A0090D863083}"/>
+              </a:ext>
+              <a:ext uri="{C183D7F6-B498-43B3-948B-1728B52AA6E4}">
+                <adec:decorative xmlns:adec="http://schemas.microsoft.com/office/drawing/2017/decorative" val="1"/>
+              </a:ext>
+            </a:extLst>
+          </p:cNvPr>
+          <p:cNvSpPr>
+            <a:spLocks noGrp="1" noRot="1" noChangeAspect="1" noMove="1" noResize="1" noEditPoints="1" noAdjustHandles="1" noChangeArrowheads="1" noChangeShapeType="1" noTextEdit="1"/>
+          </p:cNvSpPr>
+          <p:nvPr>
+            <p:extLst>
+              <p:ext uri="{386F3935-93C4-4BCD-93E2-E3B085C9AB24}">
+                <p16:designElem xmlns:p16="http://schemas.microsoft.com/office/powerpoint/2015/main" val="1"/>
+              </p:ext>
+            </p:extLst>
+          </p:nvPr>
+        </p:nvSpPr>
+        <p:spPr>
+          <a:xfrm>
+            <a:off x="4112682" y="470193"/>
+            <a:ext cx="2446744" cy="2452562"/>
+          </a:xfrm>
+          <a:custGeom>
+            <a:avLst/>
+            <a:gdLst>
+              <a:gd name="connsiteX0" fmla="*/ 0 w 2446744"/>
+              <a:gd name="connsiteY0" fmla="*/ 0 h 2452562"/>
+              <a:gd name="connsiteX1" fmla="*/ 230730 w 2446744"/>
+              <a:gd name="connsiteY1" fmla="*/ 35214 h 2452562"/>
+              <a:gd name="connsiteX2" fmla="*/ 2410483 w 2446744"/>
+              <a:gd name="connsiteY2" fmla="*/ 2214968 h 2452562"/>
+              <a:gd name="connsiteX3" fmla="*/ 2446744 w 2446744"/>
+              <a:gd name="connsiteY3" fmla="*/ 2452562 h 2452562"/>
+              <a:gd name="connsiteX4" fmla="*/ 1847625 w 2446744"/>
+              <a:gd name="connsiteY4" fmla="*/ 2452562 h 2452562"/>
+              <a:gd name="connsiteX5" fmla="*/ 1829601 w 2446744"/>
+              <a:gd name="connsiteY5" fmla="*/ 2334463 h 2452562"/>
+              <a:gd name="connsiteX6" fmla="*/ 111235 w 2446744"/>
+              <a:gd name="connsiteY6" fmla="*/ 616095 h 2452562"/>
+              <a:gd name="connsiteX7" fmla="*/ 0 w 2446744"/>
+              <a:gd name="connsiteY7" fmla="*/ 599119 h 2452562"/>
+            </a:gdLst>
+            <a:ahLst/>
+            <a:cxnLst>
+              <a:cxn ang="0">
+                <a:pos x="connsiteX0" y="connsiteY0"/>
+              </a:cxn>
+              <a:cxn ang="0">
+                <a:pos x="connsiteX1" y="connsiteY1"/>
+              </a:cxn>
+              <a:cxn ang="0">
+                <a:pos x="connsiteX2" y="connsiteY2"/>
+              </a:cxn>
+              <a:cxn ang="0">
+                <a:pos x="connsiteX3" y="connsiteY3"/>
+              </a:cxn>
+              <a:cxn ang="0">
+                <a:pos x="connsiteX4" y="connsiteY4"/>
+              </a:cxn>
+              <a:cxn ang="0">
+                <a:pos x="connsiteX5" y="connsiteY5"/>
+              </a:cxn>
+              <a:cxn ang="0">
+                <a:pos x="connsiteX6" y="connsiteY6"/>
+              </a:cxn>
+              <a:cxn ang="0">
+                <a:pos x="connsiteX7" y="connsiteY7"/>
+              </a:cxn>
+            </a:cxnLst>
+            <a:rect l="l" t="t" r="r" b="b"/>
+            <a:pathLst>
+              <a:path w="2446744" h="2452562">
+                <a:moveTo>
+                  <a:pt x="0" y="0"/>
+                </a:moveTo>
+                <a:lnTo>
+                  <a:pt x="230730" y="35214"/>
+                </a:lnTo>
+                <a:cubicBezTo>
+                  <a:pt x="1324840" y="259101"/>
+                  <a:pt x="2186596" y="1120858"/>
+                  <a:pt x="2410483" y="2214968"/>
+                </a:cubicBezTo>
+                <a:lnTo>
+                  <a:pt x="2446744" y="2452562"/>
+                </a:lnTo>
+                <a:lnTo>
+                  <a:pt x="1847625" y="2452562"/>
+                </a:lnTo>
+                <a:lnTo>
+                  <a:pt x="1829601" y="2334463"/>
+                </a:lnTo>
+                <a:cubicBezTo>
+                  <a:pt x="1653104" y="1471942"/>
+                  <a:pt x="973755" y="792593"/>
+                  <a:pt x="111235" y="616095"/>
+                </a:cubicBezTo>
+                <a:lnTo>
+                  <a:pt x="0" y="599119"/>
+                </a:lnTo>
+                <a:close/>
+              </a:path>
+            </a:pathLst>
+          </a:custGeom>
+          <a:solidFill>
+            <a:schemeClr val="accent6">
+              <a:alpha val="90000"/>
+            </a:schemeClr>
+          </a:solidFill>
+          <a:ln>
+            <a:noFill/>
+          </a:ln>
+        </p:spPr>
+        <p:style>
+          <a:lnRef idx="2">
+            <a:schemeClr val="accent1">
+              <a:shade val="50000"/>
+            </a:schemeClr>
+          </a:lnRef>
+          <a:fillRef idx="1">
+            <a:schemeClr val="accent1"/>
+          </a:fillRef>
+          <a:effectRef idx="0">
+            <a:schemeClr val="accent1"/>
+          </a:effectRef>
+          <a:fontRef idx="minor">
+            <a:schemeClr val="lt1"/>
+          </a:fontRef>
+        </p:style>
+        <p:txBody>
+          <a:bodyPr wrap="square" rtlCol="0" anchor="ctr">
+            <a:noAutofit/>
+          </a:bodyPr>
+          <a:lstStyle/>
+          <a:p>
+            <a:pPr algn="ctr"/>
+            <a:endParaRPr lang="en-US"/>
+          </a:p>
+        </p:txBody>
+      </p:sp>
+      <p:sp>
+        <p:nvSpPr>
+          <p:cNvPr id="29" name="Oval 28">
+            <a:extLst>
+              <a:ext uri="{FF2B5EF4-FFF2-40B4-BE49-F238E27FC236}">
+                <a16:creationId xmlns:a16="http://schemas.microsoft.com/office/drawing/2014/main" id="{0C082ED4-395D-4CAE-BC6E-E8E3D7AE6F43}"/>
+              </a:ext>
+              <a:ext uri="{C183D7F6-B498-43B3-948B-1728B52AA6E4}">
+                <adec:decorative xmlns:adec="http://schemas.microsoft.com/office/drawing/2017/decorative" val="1"/>
+              </a:ext>
+            </a:extLst>
+          </p:cNvPr>
+          <p:cNvSpPr>
+            <a:spLocks noGrp="1" noRot="1" noChangeAspect="1" noMove="1" noResize="1" noEditPoints="1" noAdjustHandles="1" noChangeArrowheads="1" noChangeShapeType="1" noTextEdit="1"/>
+          </p:cNvSpPr>
+          <p:nvPr>
+            <p:extLst>
+              <p:ext uri="{386F3935-93C4-4BCD-93E2-E3B085C9AB24}">
+                <p16:designElem xmlns:p16="http://schemas.microsoft.com/office/powerpoint/2015/main" val="1"/>
+              </p:ext>
+            </p:extLst>
+          </p:nvPr>
+        </p:nvSpPr>
+        <p:spPr>
+          <a:xfrm>
+            <a:off x="6014875" y="3163625"/>
+            <a:ext cx="530750" cy="530750"/>
+          </a:xfrm>
+          <a:prstGeom prst="ellipse">
+            <a:avLst/>
+          </a:prstGeom>
+          <a:solidFill>
+            <a:schemeClr val="tx1">
+              <a:lumMod val="65000"/>
+              <a:lumOff val="35000"/>
+              <a:alpha val="80000"/>
+            </a:schemeClr>
+          </a:solidFill>
+          <a:ln>
+            <a:noFill/>
+          </a:ln>
+        </p:spPr>
+        <p:style>
+          <a:lnRef idx="2">
+            <a:schemeClr val="accent1">
+              <a:shade val="50000"/>
+            </a:schemeClr>
+          </a:lnRef>
+          <a:fillRef idx="1">
+            <a:schemeClr val="accent1"/>
+          </a:fillRef>
+          <a:effectRef idx="0">
+            <a:schemeClr val="accent1"/>
+          </a:effectRef>
+          <a:fontRef idx="minor">
+            <a:schemeClr val="lt1"/>
+          </a:fontRef>
+        </p:style>
+        <p:txBody>
+          <a:bodyPr rtlCol="0" anchor="ctr"/>
+          <a:lstStyle/>
+          <a:p>
+            <a:pPr algn="ctr"/>
+            <a:endParaRPr lang="en-US"/>
+          </a:p>
+        </p:txBody>
+      </p:sp>
+      <p:sp>
+        <p:nvSpPr>
+          <p:cNvPr id="4" name="Slide Number Placeholder 3">
+            <a:extLst>
+              <a:ext uri="{FF2B5EF4-FFF2-40B4-BE49-F238E27FC236}">
+                <a16:creationId xmlns:a16="http://schemas.microsoft.com/office/drawing/2014/main" id="{4ED04BBD-269E-DA4F-9BD9-0B6AB47F8731}"/>
+              </a:ext>
+            </a:extLst>
+          </p:cNvPr>
+          <p:cNvSpPr>
+            <a:spLocks noGrp="1"/>
+          </p:cNvSpPr>
+          <p:nvPr>
+            <p:ph type="sldNum" idx="12"/>
+          </p:nvPr>
+        </p:nvSpPr>
+        <p:spPr>
+          <a:xfrm>
+            <a:off x="604414" y="3977135"/>
+            <a:ext cx="457200" cy="457200"/>
+          </a:xfrm>
+          <a:prstGeom prst="ellipse">
+            <a:avLst/>
+          </a:prstGeom>
+          <a:solidFill>
+            <a:schemeClr val="tx1">
+              <a:alpha val="80000"/>
+            </a:schemeClr>
+          </a:solidFill>
+          <a:ln w="19050">
+            <a:noFill/>
+          </a:ln>
+        </p:spPr>
+        <p:txBody>
+          <a:bodyPr vert="horz" lIns="91440" tIns="45720" rIns="91440" bIns="45720" rtlCol="0" anchor="ctr">
+            <a:normAutofit fontScale="92500"/>
+          </a:bodyPr>
+          <a:lstStyle/>
+          <a:p>
+            <a:pPr lvl="0" indent="0" algn="ctr">
+              <a:lnSpc>
+                <a:spcPct val="90000"/>
+              </a:lnSpc>
+              <a:spcBef>
+                <a:spcPts val="0"/>
+              </a:spcBef>
+              <a:spcAft>
+                <a:spcPts val="600"/>
+              </a:spcAft>
+              <a:buNone/>
+            </a:pPr>
+            <a:fld id="{00000000-1234-1234-1234-123412341234}" type="slidenum">
+              <a:rPr lang="en-US" sz="1100" kern="1200">
+                <a:solidFill>
+                  <a:schemeClr val="bg1"/>
+                </a:solidFill>
+                <a:latin typeface="+mn-lt"/>
+                <a:ea typeface="+mn-ea"/>
+                <a:cs typeface="+mn-cs"/>
+              </a:rPr>
+              <a:pPr lvl="0" indent="0" algn="ctr">
+                <a:lnSpc>
+                  <a:spcPct val="90000"/>
+                </a:lnSpc>
+                <a:spcBef>
+                  <a:spcPts val="0"/>
+                </a:spcBef>
+                <a:spcAft>
+                  <a:spcPts val="600"/>
+                </a:spcAft>
+                <a:buNone/>
+              </a:pPr>
+              <a:t>11</a:t>
+            </a:fld>
+            <a:endParaRPr lang="en-US" sz="1100" kern="1200">
+              <a:solidFill>
+                <a:schemeClr val="bg1"/>
+              </a:solidFill>
+              <a:latin typeface="+mn-lt"/>
+              <a:ea typeface="+mn-ea"/>
+              <a:cs typeface="+mn-cs"/>
+            </a:endParaRPr>
+          </a:p>
+        </p:txBody>
+      </p:sp>
+      <p:pic>
+        <p:nvPicPr>
+          <p:cNvPr id="8" name="Graphic 7" descr="Smiling Face with No Fill">
+            <a:extLst>
+              <a:ext uri="{FF2B5EF4-FFF2-40B4-BE49-F238E27FC236}">
+                <a16:creationId xmlns:a16="http://schemas.microsoft.com/office/drawing/2014/main" id="{EFF9699A-70C6-48B5-969A-6C3586ED7ED5}"/>
+              </a:ext>
+            </a:extLst>
+          </p:cNvPr>
+          <p:cNvPicPr>
+            <a:picLocks noChangeAspect="1"/>
+          </p:cNvPicPr>
+          <p:nvPr/>
+        </p:nvPicPr>
+        <p:blipFill>
+          <a:blip r:embed="rId3">
+            <a:duotone>
+              <a:prstClr val="black"/>
+              <a:prstClr val="white"/>
+            </a:duotone>
+            <a:extLst>
+              <a:ext uri="{28A0092B-C50C-407E-A947-70E740481C1C}">
+                <a14:useLocalDpi xmlns:a14="http://schemas.microsoft.com/office/drawing/2010/main" val="0"/>
+              </a:ext>
+              <a:ext uri="{96DAC541-7B7A-43D3-8B79-37D633B846F1}">
+                <asvg:svgBlip xmlns:asvg="http://schemas.microsoft.com/office/drawing/2016/SVG/main" r:embed="rId4"/>
+              </a:ext>
+            </a:extLst>
+          </a:blip>
+          <a:stretch>
+            <a:fillRect/>
+          </a:stretch>
+        </p:blipFill>
+        <p:spPr>
+          <a:xfrm>
+            <a:off x="1712065" y="2259203"/>
+            <a:ext cx="3550028" cy="3550028"/>
+          </a:xfrm>
+          <a:prstGeom prst="rect">
+            <a:avLst/>
+          </a:prstGeom>
+        </p:spPr>
+      </p:pic>
+    </p:spTree>
+    <p:extLst>
+      <p:ext uri="{BB962C8B-B14F-4D97-AF65-F5344CB8AC3E}">
+        <p14:creationId xmlns:p14="http://schemas.microsoft.com/office/powerpoint/2010/main" val="506416198"/>
+      </p:ext>
+    </p:extLst>
+  </p:cSld>
+  <p:clrMapOvr>
+    <a:masterClrMapping/>
+  </p:clrMapOvr>
+</p:sld>
+</file>
+
 <file path=ppt/slides/slide2.xml><?xml version="1.0" encoding="utf-8"?>
 <p:sld xmlns:a="http://schemas.openxmlformats.org/drawingml/2006/main" xmlns:r="http://schemas.openxmlformats.org/officeDocument/2006/relationships" xmlns:p="http://schemas.openxmlformats.org/presentationml/2006/main">
   <p:cSld>
@@ -11406,10 +12013,10 @@
               <a:buNone/>
             </a:pPr>
             <a:r>
-              <a:rPr lang="en-US"/>
-              <a:t>Background - Problem</a:t>
+              <a:rPr lang="en-US" dirty="0"/>
+              <a:t>Background - Solution</a:t>
             </a:r>
-            <a:endParaRPr/>
+            <a:endParaRPr dirty="0"/>
           </a:p>
         </p:txBody>
       </p:sp>

</xml_diff>